<commit_message>
Cours 2 : sans fichiers dragon
</commit_message>
<xml_diff>
--- a/Cours2.pptx
+++ b/Cours2.pptx
@@ -5,10 +5,10 @@
     <p:sldMasterId id="2147483648" r:id="rId1"/>
   </p:sldMasterIdLst>
   <p:notesMasterIdLst>
-    <p:notesMasterId r:id="rId11"/>
+    <p:notesMasterId r:id="rId12"/>
   </p:notesMasterIdLst>
   <p:handoutMasterIdLst>
-    <p:handoutMasterId r:id="rId12"/>
+    <p:handoutMasterId r:id="rId13"/>
   </p:handoutMasterIdLst>
   <p:sldIdLst>
     <p:sldId id="324" r:id="rId2"/>
@@ -19,7 +19,8 @@
     <p:sldId id="332" r:id="rId7"/>
     <p:sldId id="331" r:id="rId8"/>
     <p:sldId id="329" r:id="rId9"/>
-    <p:sldId id="330" r:id="rId10"/>
+    <p:sldId id="333" r:id="rId10"/>
+    <p:sldId id="335" r:id="rId11"/>
   </p:sldIdLst>
   <p:sldSz cx="9144000" cy="6858000" type="screen4x3"/>
   <p:notesSz cx="6858000" cy="9144000"/>
@@ -155,6 +156,7 @@
 <p:cmAuthorLst xmlns:a="http://schemas.openxmlformats.org/drawingml/2006/main" xmlns:r="http://schemas.openxmlformats.org/officeDocument/2006/relationships" xmlns:p="http://schemas.openxmlformats.org/presentationml/2006/main">
   <p:cmAuthor id="0" name="dc" initials="dc" lastIdx="31" clrIdx="0"/>
   <p:cmAuthor id="1" name="$Galichet" initials="$" lastIdx="1" clrIdx="1"/>
+  <p:cmAuthor id="2" name="Jacquet Philippe" initials="JP" lastIdx="1" clrIdx="2"/>
 </p:cmAuthorLst>
 </file>
 
@@ -249,7 +251,7 @@
               <a:pPr>
                 <a:defRPr/>
               </a:pPr>
-              <a:t>04/11/2013</a:t>
+              <a:t>07/11/2013</a:t>
             </a:fld>
             <a:endParaRPr lang="fr-FR"/>
           </a:p>
@@ -448,7 +450,7 @@
               <a:pPr>
                 <a:defRPr/>
               </a:pPr>
-              <a:t>04/11/2013</a:t>
+              <a:t>07/11/2013</a:t>
             </a:fld>
             <a:endParaRPr lang="fr-FR"/>
           </a:p>
@@ -2288,6 +2290,269 @@
 </p:sld>
 </file>
 
+<file path=ppt/slides/slide10.xml><?xml version="1.0" encoding="utf-8"?>
+<p:sld xmlns:a="http://schemas.openxmlformats.org/drawingml/2006/main" xmlns:r="http://schemas.openxmlformats.org/officeDocument/2006/relationships" xmlns:p="http://schemas.openxmlformats.org/presentationml/2006/main">
+  <p:cSld>
+    <p:spTree>
+      <p:nvGrpSpPr>
+        <p:cNvPr id="1" name=""/>
+        <p:cNvGrpSpPr/>
+        <p:nvPr/>
+      </p:nvGrpSpPr>
+      <p:grpSpPr>
+        <a:xfrm>
+          <a:off x="0" y="0"/>
+          <a:ext cx="0" cy="0"/>
+          <a:chOff x="0" y="0"/>
+          <a:chExt cx="0" cy="0"/>
+        </a:xfrm>
+      </p:grpSpPr>
+      <p:sp>
+        <p:nvSpPr>
+          <p:cNvPr id="2" name="Titre 1"/>
+          <p:cNvSpPr>
+            <a:spLocks noGrp="1"/>
+          </p:cNvSpPr>
+          <p:nvPr>
+            <p:ph type="title"/>
+          </p:nvPr>
+        </p:nvSpPr>
+        <p:spPr>
+          <a:xfrm>
+            <a:off x="554066" y="214290"/>
+            <a:ext cx="8229600" cy="1143000"/>
+          </a:xfrm>
+        </p:spPr>
+        <p:txBody>
+          <a:bodyPr/>
+          <a:lstStyle/>
+          <a:p>
+            <a:r>
+              <a:rPr lang="fr-FR" dirty="0" smtClean="0"/>
+              <a:t>Contrôle du réacteur</a:t>
+            </a:r>
+            <a:endParaRPr lang="fr-FR" dirty="0"/>
+          </a:p>
+        </p:txBody>
+      </p:sp>
+      <p:sp>
+        <p:nvSpPr>
+          <p:cNvPr id="3" name="Espace réservé du contenu 2"/>
+          <p:cNvSpPr>
+            <a:spLocks noGrp="1"/>
+          </p:cNvSpPr>
+          <p:nvPr>
+            <p:ph idx="1"/>
+          </p:nvPr>
+        </p:nvSpPr>
+        <p:spPr>
+          <a:xfrm>
+            <a:off x="0" y="1285860"/>
+            <a:ext cx="8748464" cy="4840303"/>
+          </a:xfrm>
+        </p:spPr>
+        <p:txBody>
+          <a:bodyPr/>
+          <a:lstStyle/>
+          <a:p>
+            <a:pPr marL="342900" lvl="1" indent="-342900">
+              <a:buClr>
+                <a:srgbClr val="FF0000"/>
+              </a:buClr>
+              <a:buFont typeface="Wingdings" pitchFamily="2" charset="2"/>
+              <a:buChar char="q"/>
+            </a:pPr>
+            <a:r>
+              <a:rPr lang="fr-FR" dirty="0" smtClean="0"/>
+              <a:t>Efficacité </a:t>
+            </a:r>
+            <a:r>
+              <a:rPr lang="fr-FR" dirty="0"/>
+              <a:t>du </a:t>
+            </a:r>
+            <a:r>
+              <a:rPr lang="fr-FR" dirty="0" smtClean="0"/>
+              <a:t>bore</a:t>
+            </a:r>
+            <a:endParaRPr lang="fr-FR" dirty="0"/>
+          </a:p>
+          <a:p>
+            <a:pPr marL="349250" lvl="1"/>
+            <a:r>
+              <a:rPr lang="fr-FR" dirty="0"/>
+              <a:t>Dans le cas des REP, le contrôle de la réactivité est aussi assuré par ajustement de la concentration en acide borique enrichi en B10 dans le circuit primaire</a:t>
+            </a:r>
+          </a:p>
+          <a:p>
+            <a:pPr marL="349250" lvl="1"/>
+            <a:r>
+              <a:rPr lang="fr-FR" dirty="0"/>
+              <a:t>Moins « souple » que les barres, la principale utilisation du bore primaire est la compensation de la perte de réactivité au cours de l’épuisement du combustible par dilution du primaire avec de l’eau « claire »</a:t>
+            </a:r>
+          </a:p>
+          <a:p>
+            <a:pPr marL="349250" lvl="1"/>
+            <a:r>
+              <a:rPr lang="fr-FR" dirty="0"/>
+              <a:t>La fin d’un cycle de rechargement est donc défini par une concentration </a:t>
+            </a:r>
+            <a:r>
+              <a:rPr lang="fr-FR" dirty="0" smtClean="0"/>
+              <a:t>en bore nulle</a:t>
+            </a:r>
+          </a:p>
+          <a:p>
+            <a:pPr marL="342900" lvl="1" indent="-342900">
+              <a:buClr>
+                <a:srgbClr val="FF0000"/>
+              </a:buClr>
+              <a:buFont typeface="Wingdings" pitchFamily="2" charset="2"/>
+              <a:buChar char="q"/>
+            </a:pPr>
+            <a:r>
+              <a:rPr lang="fr-FR" dirty="0" smtClean="0"/>
+              <a:t>L’efficacité du Bore typique est de : -10 </a:t>
+            </a:r>
+            <a:r>
+              <a:rPr lang="fr-FR" dirty="0" err="1" smtClean="0"/>
+              <a:t>pcm</a:t>
+            </a:r>
+            <a:r>
+              <a:rPr lang="fr-FR" dirty="0" smtClean="0"/>
+              <a:t>/ppm</a:t>
+            </a:r>
+            <a:endParaRPr lang="fr-FR" dirty="0"/>
+          </a:p>
+          <a:p>
+            <a:pPr marL="349250" lvl="1"/>
+            <a:r>
+              <a:rPr lang="fr-FR" dirty="0"/>
+              <a:t>La coefficient Densité-Modérateur</a:t>
+            </a:r>
+          </a:p>
+          <a:p>
+            <a:pPr marL="349250" lvl="1"/>
+            <a:r>
+              <a:rPr lang="fr-FR" dirty="0"/>
+              <a:t>La concentration en bore est donc maximale en début de cycle</a:t>
+            </a:r>
+          </a:p>
+          <a:p>
+            <a:pPr marL="349250" lvl="1"/>
+            <a:r>
+              <a:rPr lang="fr-FR" dirty="0"/>
+              <a:t>Attention : au cours d’un échauffement, la dilatation de l’eau conduit à une diminution de la quantité de bore dans le cœur analogue à une dilution, compensant l’effet modérateur</a:t>
+            </a:r>
+          </a:p>
+          <a:p>
+            <a:pPr marL="349250" lvl="1"/>
+            <a:r>
+              <a:rPr lang="fr-FR" dirty="0"/>
+              <a:t>Le coefficient </a:t>
+            </a:r>
+            <a:r>
+              <a:rPr lang="fr-FR" dirty="0" smtClean="0"/>
+              <a:t>Densité-Modérateur en </a:t>
+            </a:r>
+            <a:r>
+              <a:rPr lang="fr-FR" dirty="0" err="1" smtClean="0"/>
+              <a:t>pcm</a:t>
+            </a:r>
+            <a:r>
+              <a:rPr lang="fr-FR" dirty="0" smtClean="0"/>
+              <a:t>/°C doit toujours être négatif</a:t>
+            </a:r>
+          </a:p>
+        </p:txBody>
+      </p:sp>
+      <p:sp>
+        <p:nvSpPr>
+          <p:cNvPr id="4" name="Espace réservé du numéro de diapositive 3"/>
+          <p:cNvSpPr>
+            <a:spLocks noGrp="1"/>
+          </p:cNvSpPr>
+          <p:nvPr>
+            <p:ph type="sldNum" sz="quarter" idx="10"/>
+          </p:nvPr>
+        </p:nvSpPr>
+        <p:spPr/>
+        <p:txBody>
+          <a:bodyPr/>
+          <a:lstStyle/>
+          <a:p>
+            <a:pPr>
+              <a:defRPr/>
+            </a:pPr>
+            <a:fld id="{59AC561E-4C57-476C-B893-1064C8457BAD}" type="slidenum">
+              <a:rPr lang="fr-FR" smtClean="0"/>
+              <a:pPr>
+                <a:defRPr/>
+              </a:pPr>
+              <a:t>10</a:t>
+            </a:fld>
+            <a:endParaRPr lang="fr-FR" dirty="0"/>
+          </a:p>
+        </p:txBody>
+      </p:sp>
+      <p:sp>
+        <p:nvSpPr>
+          <p:cNvPr id="5" name="AutoShape 2" descr="http://upload.wikimedia.org/wikipedia/commons/a/a7/Centrale_nucleaire_REP.png"/>
+          <p:cNvSpPr>
+            <a:spLocks noChangeAspect="1" noChangeArrowheads="1"/>
+          </p:cNvSpPr>
+          <p:nvPr/>
+        </p:nvSpPr>
+        <p:spPr bwMode="auto">
+          <a:xfrm>
+            <a:off x="63500" y="-136525"/>
+            <a:ext cx="304800" cy="304800"/>
+          </a:xfrm>
+          <a:prstGeom prst="rect">
+            <a:avLst/>
+          </a:prstGeom>
+          <a:noFill/>
+          <a:extLst>
+            <a:ext uri="{909E8E84-426E-40DD-AFC4-6F175D3DCCD1}">
+              <a14:hiddenFill xmlns:a14="http://schemas.microsoft.com/office/drawing/2010/main">
+                <a:solidFill>
+                  <a:srgbClr val="FFFFFF"/>
+                </a:solidFill>
+              </a14:hiddenFill>
+            </a:ext>
+          </a:extLst>
+        </p:spPr>
+        <p:txBody>
+          <a:bodyPr vert="horz" wrap="square" lIns="91440" tIns="45720" rIns="91440" bIns="45720" numCol="1" anchor="t" anchorCtr="0" compatLnSpc="1">
+            <a:prstTxWarp prst="textNoShape">
+              <a:avLst/>
+            </a:prstTxWarp>
+          </a:bodyPr>
+          <a:lstStyle/>
+          <a:p>
+            <a:endParaRPr lang="en-US"/>
+          </a:p>
+        </p:txBody>
+      </p:sp>
+    </p:spTree>
+    <p:extLst>
+      <p:ext uri="{BB962C8B-B14F-4D97-AF65-F5344CB8AC3E}">
+        <p14:creationId xmlns:p14="http://schemas.microsoft.com/office/powerpoint/2010/main" val="1551262769"/>
+      </p:ext>
+    </p:extLst>
+  </p:cSld>
+  <p:clrMapOvr>
+    <a:masterClrMapping/>
+  </p:clrMapOvr>
+  <p:timing>
+    <p:tnLst>
+      <p:par>
+        <p:cTn id="1" dur="indefinite" restart="never" nodeType="tmRoot"/>
+      </p:par>
+    </p:tnLst>
+  </p:timing>
+</p:sld>
+</file>
+
 <file path=ppt/slides/slide2.xml><?xml version="1.0" encoding="utf-8"?>
 <p:sld xmlns:a="http://schemas.openxmlformats.org/drawingml/2006/main" xmlns:r="http://schemas.openxmlformats.org/officeDocument/2006/relationships" xmlns:p="http://schemas.openxmlformats.org/presentationml/2006/main">
   <p:cSld>
@@ -3849,9 +4114,47 @@
           </a:p>
         </p:txBody>
       </p:sp>
+      <p:sp>
+        <p:nvSpPr>
+          <p:cNvPr id="8" name="ZoneTexte 7"/>
+          <p:cNvSpPr txBox="1"/>
+          <p:nvPr/>
+        </p:nvSpPr>
+        <p:spPr>
+          <a:xfrm>
+            <a:off x="189086" y="4212377"/>
+            <a:ext cx="1502594" cy="584775"/>
+          </a:xfrm>
+          <a:prstGeom prst="rect">
+            <a:avLst/>
+          </a:prstGeom>
+          <a:noFill/>
+        </p:spPr>
+        <p:txBody>
+          <a:bodyPr wrap="square" rtlCol="0">
+            <a:spAutoFit/>
+          </a:bodyPr>
+          <a:lstStyle/>
+          <a:p>
+            <a:pPr algn="ctr"/>
+            <a:r>
+              <a:rPr lang="en-US" sz="1600" b="1" i="1" u="none" dirty="0" smtClean="0"/>
+              <a:t>REP </a:t>
+            </a:r>
+          </a:p>
+          <a:p>
+            <a:pPr algn="ctr"/>
+            <a:r>
+              <a:rPr lang="en-US" sz="1600" b="1" i="1" u="none" dirty="0" smtClean="0"/>
+              <a:t>900MWe</a:t>
+            </a:r>
+            <a:endParaRPr lang="en-US" sz="1600" b="1" i="1" u="none" dirty="0"/>
+          </a:p>
+        </p:txBody>
+      </p:sp>
       <p:pic>
         <p:nvPicPr>
-          <p:cNvPr id="7" name="Picture 3"/>
+          <p:cNvPr id="3074" name="Picture 2"/>
           <p:cNvPicPr>
             <a:picLocks noChangeAspect="1" noChangeArrowheads="1"/>
           </p:cNvPicPr>
@@ -3859,6 +4162,16 @@
         </p:nvPicPr>
         <p:blipFill>
           <a:blip r:embed="rId2" cstate="print">
+            <a:clrChange>
+              <a:clrFrom>
+                <a:srgbClr val="FFFFFF"/>
+              </a:clrFrom>
+              <a:clrTo>
+                <a:srgbClr val="FFFFFF">
+                  <a:alpha val="0"/>
+                </a:srgbClr>
+              </a:clrTo>
+            </a:clrChange>
             <a:extLst>
               <a:ext uri="{28A0092B-C50C-407E-A947-70E740481C1C}">
                 <a14:useLocalDpi xmlns:a14="http://schemas.microsoft.com/office/drawing/2010/main" val="0"/>
@@ -3872,62 +4185,22 @@
         </p:blipFill>
         <p:spPr bwMode="auto">
           <a:xfrm>
-            <a:off x="215899" y="2311621"/>
-            <a:ext cx="2252353" cy="2053483"/>
+            <a:off x="3804112" y="2536150"/>
+            <a:ext cx="1599692" cy="1532211"/>
           </a:xfrm>
           <a:prstGeom prst="rect">
             <a:avLst/>
           </a:prstGeom>
-          <a:solidFill>
-            <a:schemeClr val="bg1"/>
-          </a:solidFill>
+          <a:noFill/>
           <a:ln>
             <a:noFill/>
           </a:ln>
           <a:effectLst/>
         </p:spPr>
       </p:pic>
-      <p:sp>
-        <p:nvSpPr>
-          <p:cNvPr id="8" name="ZoneTexte 7"/>
-          <p:cNvSpPr txBox="1"/>
-          <p:nvPr/>
-        </p:nvSpPr>
-        <p:spPr>
-          <a:xfrm>
-            <a:off x="590778" y="4509120"/>
-            <a:ext cx="1502594" cy="584775"/>
-          </a:xfrm>
-          <a:prstGeom prst="rect">
-            <a:avLst/>
-          </a:prstGeom>
-          <a:noFill/>
-        </p:spPr>
-        <p:txBody>
-          <a:bodyPr wrap="square" rtlCol="0">
-            <a:spAutoFit/>
-          </a:bodyPr>
-          <a:lstStyle/>
-          <a:p>
-            <a:pPr algn="ctr"/>
-            <a:r>
-              <a:rPr lang="en-US" sz="1600" b="1" i="1" u="none" dirty="0" smtClean="0"/>
-              <a:t>REP </a:t>
-            </a:r>
-          </a:p>
-          <a:p>
-            <a:pPr algn="ctr"/>
-            <a:r>
-              <a:rPr lang="en-US" sz="1600" b="1" i="1" u="none" dirty="0" smtClean="0"/>
-              <a:t>900MWe</a:t>
-            </a:r>
-            <a:endParaRPr lang="en-US" sz="1600" b="1" i="1" u="none" dirty="0"/>
-          </a:p>
-        </p:txBody>
-      </p:sp>
       <p:pic>
         <p:nvPicPr>
-          <p:cNvPr id="3074" name="Picture 2"/>
+          <p:cNvPr id="3075" name="Picture 3"/>
           <p:cNvPicPr>
             <a:picLocks noChangeAspect="1" noChangeArrowheads="1"/>
           </p:cNvPicPr>
@@ -3958,54 +4231,8 @@
         </p:blipFill>
         <p:spPr bwMode="auto">
           <a:xfrm>
-            <a:off x="2468252" y="2287633"/>
-            <a:ext cx="2168966" cy="2077471"/>
-          </a:xfrm>
-          <a:prstGeom prst="rect">
-            <a:avLst/>
-          </a:prstGeom>
-          <a:noFill/>
-          <a:ln>
-            <a:noFill/>
-          </a:ln>
-          <a:effectLst/>
-        </p:spPr>
-      </p:pic>
-      <p:pic>
-        <p:nvPicPr>
-          <p:cNvPr id="3075" name="Picture 3"/>
-          <p:cNvPicPr>
-            <a:picLocks noChangeAspect="1" noChangeArrowheads="1"/>
-          </p:cNvPicPr>
-          <p:nvPr/>
-        </p:nvPicPr>
-        <p:blipFill>
-          <a:blip r:embed="rId4">
-            <a:clrChange>
-              <a:clrFrom>
-                <a:srgbClr val="FFFFFF"/>
-              </a:clrFrom>
-              <a:clrTo>
-                <a:srgbClr val="FFFFFF">
-                  <a:alpha val="0"/>
-                </a:srgbClr>
-              </a:clrTo>
-            </a:clrChange>
-            <a:extLst>
-              <a:ext uri="{28A0092B-C50C-407E-A947-70E740481C1C}">
-                <a14:useLocalDpi xmlns:a14="http://schemas.microsoft.com/office/drawing/2010/main" val="0"/>
-              </a:ext>
-            </a:extLst>
-          </a:blip>
-          <a:srcRect/>
-          <a:stretch>
-            <a:fillRect/>
-          </a:stretch>
-        </p:blipFill>
-        <p:spPr bwMode="auto">
-          <a:xfrm>
-            <a:off x="6516216" y="2287633"/>
-            <a:ext cx="2363911" cy="2038939"/>
+            <a:off x="7059988" y="2363568"/>
+            <a:ext cx="1976508" cy="1704793"/>
           </a:xfrm>
           <a:prstGeom prst="rect">
             <a:avLst/>
@@ -4054,7 +4281,7 @@
           <p:nvPr/>
         </p:nvPicPr>
         <p:blipFill>
-          <a:blip r:embed="rId5">
+          <a:blip r:embed="rId4" cstate="print">
             <a:clrChange>
               <a:clrFrom>
                 <a:srgbClr val="FFFFFF"/>
@@ -4078,8 +4305,8 @@
         </p:blipFill>
         <p:spPr bwMode="auto">
           <a:xfrm>
-            <a:off x="4637218" y="2193233"/>
-            <a:ext cx="2263640" cy="2171871"/>
+            <a:off x="5478596" y="2343813"/>
+            <a:ext cx="1797416" cy="1724548"/>
           </a:xfrm>
           <a:prstGeom prst="rect">
             <a:avLst/>
@@ -4127,7 +4354,7 @@
         </p:nvSpPr>
         <p:spPr>
           <a:xfrm>
-            <a:off x="2809202" y="4509120"/>
+            <a:off x="3829202" y="4212377"/>
             <a:ext cx="1502594" cy="584775"/>
           </a:xfrm>
           <a:prstGeom prst="rect">
@@ -4165,7 +4392,7 @@
         </p:nvSpPr>
         <p:spPr>
           <a:xfrm>
-            <a:off x="4932040" y="4509120"/>
+            <a:off x="5547820" y="4212377"/>
             <a:ext cx="1502594" cy="584775"/>
           </a:xfrm>
           <a:prstGeom prst="rect">
@@ -4211,7 +4438,7 @@
         </p:nvSpPr>
         <p:spPr>
           <a:xfrm>
-            <a:off x="6907158" y="4509120"/>
+            <a:off x="7234906" y="4212377"/>
             <a:ext cx="1585566" cy="584775"/>
           </a:xfrm>
           <a:prstGeom prst="rect">
@@ -4245,6 +4472,113 @@
           </a:p>
         </p:txBody>
       </p:sp>
+      <p:pic>
+        <p:nvPicPr>
+          <p:cNvPr id="2052" name="Picture 4"/>
+          <p:cNvPicPr>
+            <a:picLocks noChangeAspect="1" noChangeArrowheads="1"/>
+          </p:cNvPicPr>
+          <p:nvPr/>
+        </p:nvPicPr>
+        <p:blipFill>
+          <a:blip r:embed="rId5" cstate="print">
+            <a:extLst>
+              <a:ext uri="{28A0092B-C50C-407E-A947-70E740481C1C}">
+                <a14:useLocalDpi xmlns:a14="http://schemas.microsoft.com/office/drawing/2010/main" val="0"/>
+              </a:ext>
+            </a:extLst>
+          </a:blip>
+          <a:srcRect/>
+          <a:stretch>
+            <a:fillRect/>
+          </a:stretch>
+        </p:blipFill>
+        <p:spPr bwMode="auto">
+          <a:xfrm>
+            <a:off x="2051720" y="2557797"/>
+            <a:ext cx="1594246" cy="1461717"/>
+          </a:xfrm>
+          <a:prstGeom prst="rect">
+            <a:avLst/>
+          </a:prstGeom>
+          <a:solidFill>
+            <a:schemeClr val="bg1"/>
+          </a:solidFill>
+          <a:ln>
+            <a:noFill/>
+          </a:ln>
+          <a:effectLst/>
+        </p:spPr>
+      </p:pic>
+      <p:sp>
+        <p:nvSpPr>
+          <p:cNvPr id="17" name="ZoneTexte 16"/>
+          <p:cNvSpPr txBox="1"/>
+          <p:nvPr/>
+        </p:nvSpPr>
+        <p:spPr>
+          <a:xfrm>
+            <a:off x="2051720" y="4212377"/>
+            <a:ext cx="1502594" cy="584775"/>
+          </a:xfrm>
+          <a:prstGeom prst="rect">
+            <a:avLst/>
+          </a:prstGeom>
+          <a:noFill/>
+        </p:spPr>
+        <p:txBody>
+          <a:bodyPr wrap="square" rtlCol="0">
+            <a:spAutoFit/>
+          </a:bodyPr>
+          <a:lstStyle/>
+          <a:p>
+            <a:pPr algn="ctr"/>
+            <a:r>
+              <a:rPr lang="en-US" sz="1600" b="1" i="1" u="none" dirty="0" smtClean="0"/>
+              <a:t>EPR 1650MWe</a:t>
+            </a:r>
+            <a:endParaRPr lang="en-US" sz="1600" b="1" i="1" u="none" dirty="0"/>
+          </a:p>
+        </p:txBody>
+      </p:sp>
+      <p:pic>
+        <p:nvPicPr>
+          <p:cNvPr id="1026" name="Picture 2"/>
+          <p:cNvPicPr>
+            <a:picLocks noChangeAspect="1" noChangeArrowheads="1"/>
+          </p:cNvPicPr>
+          <p:nvPr/>
+        </p:nvPicPr>
+        <p:blipFill>
+          <a:blip r:embed="rId6" cstate="print">
+            <a:extLst>
+              <a:ext uri="{28A0092B-C50C-407E-A947-70E740481C1C}">
+                <a14:useLocalDpi xmlns:a14="http://schemas.microsoft.com/office/drawing/2010/main" val="0"/>
+              </a:ext>
+            </a:extLst>
+          </a:blip>
+          <a:srcRect/>
+          <a:stretch>
+            <a:fillRect/>
+          </a:stretch>
+        </p:blipFill>
+        <p:spPr bwMode="auto">
+          <a:xfrm>
+            <a:off x="145832" y="2536150"/>
+            <a:ext cx="1617856" cy="1483364"/>
+          </a:xfrm>
+          <a:prstGeom prst="rect">
+            <a:avLst/>
+          </a:prstGeom>
+          <a:solidFill>
+            <a:schemeClr val="bg1"/>
+          </a:solidFill>
+          <a:ln>
+            <a:noFill/>
+          </a:ln>
+          <a:effectLst/>
+        </p:spPr>
+      </p:pic>
     </p:spTree>
     <p:extLst>
       <p:ext uri="{BB962C8B-B14F-4D97-AF65-F5344CB8AC3E}">
@@ -4368,11 +4702,7 @@
             <a:pPr lvl="1"/>
             <a:r>
               <a:rPr lang="fr-FR" dirty="0" smtClean="0"/>
-              <a:t>La dilation du modérateur par échauffement a donc un effet négatif sur la </a:t>
-            </a:r>
-            <a:r>
-              <a:rPr lang="fr-FR" dirty="0" smtClean="0"/>
-              <a:t>réactivité</a:t>
+              <a:t>La dilation du modérateur par échauffement a donc un effet négatif sur la réactivité</a:t>
             </a:r>
           </a:p>
           <a:p>
@@ -4410,7 +4740,6 @@
               <a:rPr lang="fr-FR" sz="1400" dirty="0" smtClean="0"/>
               <a:t>modérateur</a:t>
             </a:r>
-            <a:endParaRPr lang="fr-FR" sz="1400" dirty="0" smtClean="0"/>
           </a:p>
           <a:p>
             <a:endParaRPr lang="fr-FR" dirty="0" smtClean="0"/>
@@ -4732,19 +5061,7 @@
           <a:p>
             <a:r>
               <a:rPr lang="fr-FR" dirty="0" smtClean="0"/>
-              <a:t>L’effet </a:t>
-            </a:r>
-            <a:r>
-              <a:rPr lang="fr-FR" dirty="0" smtClean="0"/>
-              <a:t>Doppler (</a:t>
-            </a:r>
-            <a:r>
-              <a:rPr lang="fr-FR" dirty="0" smtClean="0"/>
-              <a:t>REP et RNR</a:t>
-            </a:r>
-            <a:r>
-              <a:rPr lang="fr-FR" dirty="0" smtClean="0"/>
-              <a:t>)</a:t>
+              <a:t>L’effet Doppler (REP et RNR)</a:t>
             </a:r>
           </a:p>
           <a:p>
@@ -4887,11 +5204,7 @@
             </a:r>
             <a:r>
               <a:rPr lang="fr-FR" dirty="0" smtClean="0"/>
-              <a:t>réactivité </a:t>
-            </a:r>
-            <a:r>
-              <a:rPr lang="fr-FR" dirty="0" smtClean="0"/>
-              <a:t>↘</a:t>
+              <a:t>réactivité ↘</a:t>
             </a:r>
           </a:p>
           <a:p>
@@ -5144,15 +5457,7 @@
           <a:p>
             <a:r>
               <a:rPr lang="fr-FR" dirty="0" smtClean="0"/>
-              <a:t>L’effet </a:t>
-            </a:r>
-            <a:r>
-              <a:rPr lang="fr-FR" dirty="0" smtClean="0"/>
-              <a:t>de Vidange (LMFR</a:t>
-            </a:r>
-            <a:r>
-              <a:rPr lang="fr-FR" dirty="0" smtClean="0"/>
-              <a:t>)</a:t>
+              <a:t>L’effet de Vidange (LMFR)</a:t>
             </a:r>
           </a:p>
           <a:p>
@@ -5422,7 +5727,7 @@
         <p:spPr>
           <a:xfrm>
             <a:off x="0" y="1285860"/>
-            <a:ext cx="9144000" cy="4840303"/>
+            <a:ext cx="6866012" cy="4840303"/>
           </a:xfrm>
         </p:spPr>
         <p:txBody>
@@ -5431,19 +5736,122 @@
           <a:p>
             <a:r>
               <a:rPr lang="fr-FR" dirty="0" smtClean="0"/>
-              <a:t>Les « grappes » ou les « barres » de poisons </a:t>
-            </a:r>
-          </a:p>
-          <a:p>
-            <a:r>
-              <a:rPr lang="fr-FR" dirty="0" smtClean="0"/>
-              <a:t>L’efficacité du bore</a:t>
-            </a:r>
-          </a:p>
-          <a:p>
-            <a:r>
-              <a:rPr lang="fr-FR" dirty="0" smtClean="0"/>
-              <a:t>Le coefficient « Densité-Modérateur »</a:t>
+              <a:t>Les « grappes » ou les « barres » de poisons</a:t>
+            </a:r>
+          </a:p>
+          <a:p>
+            <a:pPr marL="0" indent="0">
+              <a:buNone/>
+            </a:pPr>
+            <a:r>
+              <a:rPr lang="fr-FR" u="sng" dirty="0" smtClean="0"/>
+              <a:t>Les grappes dans les REP Français</a:t>
+            </a:r>
+          </a:p>
+          <a:p>
+            <a:pPr marL="349250" lvl="1"/>
+            <a:r>
+              <a:rPr lang="fr-FR" dirty="0" smtClean="0"/>
+              <a:t>Il y a 89 grappes dans l’EPR : environ 1 assemblage combustible sur 3 est contrôlé par une grappe</a:t>
+            </a:r>
+          </a:p>
+          <a:p>
+            <a:pPr marL="349250" lvl="1"/>
+            <a:r>
+              <a:rPr lang="fr-FR" dirty="0" smtClean="0"/>
+              <a:t>Les grappes sont constitués de 24 crayons </a:t>
+            </a:r>
+            <a:r>
+              <a:rPr lang="fr-FR" dirty="0"/>
+              <a:t>de contrôle </a:t>
+            </a:r>
+            <a:r>
+              <a:rPr lang="fr-FR" dirty="0" smtClean="0"/>
+              <a:t>s’insérant </a:t>
+            </a:r>
+            <a:r>
+              <a:rPr lang="fr-FR" dirty="0"/>
+              <a:t>dans le réseau de 17x17 crayons </a:t>
+            </a:r>
+            <a:r>
+              <a:rPr lang="fr-FR" dirty="0" smtClean="0"/>
+              <a:t>à travers des tubes guides</a:t>
+            </a:r>
+          </a:p>
+          <a:p>
+            <a:pPr marL="349250" lvl="1"/>
+            <a:r>
+              <a:rPr lang="fr-FR" dirty="0" smtClean="0"/>
+              <a:t>Sur les REP français, on distingue :</a:t>
+            </a:r>
+          </a:p>
+          <a:p>
+            <a:pPr marL="749300" lvl="2"/>
+            <a:r>
+              <a:rPr lang="fr-FR" dirty="0" smtClean="0"/>
+              <a:t>Les grappes « noires » : les crayons sont composés d’AIC</a:t>
+            </a:r>
+            <a:r>
+              <a:rPr lang="fr-FR" baseline="30000" dirty="0"/>
+              <a:t> </a:t>
+            </a:r>
+            <a:r>
+              <a:rPr lang="fr-FR" baseline="30000" dirty="0" smtClean="0"/>
+              <a:t>(*)</a:t>
+            </a:r>
+            <a:r>
+              <a:rPr lang="fr-FR" dirty="0" smtClean="0"/>
+              <a:t> et de B4C</a:t>
+            </a:r>
+            <a:r>
+              <a:rPr lang="fr-FR" baseline="30000" dirty="0" smtClean="0"/>
+              <a:t>(**)</a:t>
+            </a:r>
+          </a:p>
+          <a:p>
+            <a:pPr marL="749300" lvl="2"/>
+            <a:r>
+              <a:rPr lang="fr-FR" dirty="0"/>
+              <a:t>Les grappes « </a:t>
+            </a:r>
+            <a:r>
+              <a:rPr lang="fr-FR" dirty="0" smtClean="0"/>
+              <a:t>grises</a:t>
+            </a:r>
+            <a:r>
+              <a:rPr lang="fr-FR" dirty="0"/>
+              <a:t> » : </a:t>
+            </a:r>
+            <a:r>
+              <a:rPr lang="fr-FR" dirty="0" smtClean="0"/>
+              <a:t>seuls 8 crayons sont absorbants, les autres sont diluants en inox </a:t>
+            </a:r>
+            <a:endParaRPr lang="fr-FR" baseline="30000" dirty="0" smtClean="0"/>
+          </a:p>
+          <a:p>
+            <a:pPr marL="355600" lvl="1" indent="0">
+              <a:buNone/>
+            </a:pPr>
+            <a:r>
+              <a:rPr lang="fr-FR" sz="1400" baseline="30000" dirty="0"/>
+              <a:t>(*)</a:t>
+            </a:r>
+            <a:r>
+              <a:rPr lang="fr-FR" sz="1400" dirty="0"/>
+              <a:t> Argent-Indium-Cadmium (AIC) ou en </a:t>
+            </a:r>
+          </a:p>
+          <a:p>
+            <a:pPr marL="355600" lvl="1" indent="0">
+              <a:buNone/>
+            </a:pPr>
+            <a:r>
+              <a:rPr lang="fr-FR" sz="1400" baseline="30000" dirty="0"/>
+              <a:t>(**)</a:t>
+            </a:r>
+            <a:r>
+              <a:rPr lang="fr-FR" sz="1400" dirty="0"/>
+              <a:t> carbure de bore, enrichi à 19,9% de Bore 10</a:t>
             </a:r>
           </a:p>
           <a:p>
@@ -5525,6 +5933,52 @@
           </a:p>
         </p:txBody>
       </p:sp>
+      <p:pic>
+        <p:nvPicPr>
+          <p:cNvPr id="6" name="Image 5" descr="shéma fabrication-assemblage d'un combustible"/>
+          <p:cNvPicPr/>
+          <p:nvPr/>
+        </p:nvPicPr>
+        <p:blipFill rotWithShape="1">
+          <a:blip r:embed="rId2">
+            <a:clrChange>
+              <a:clrFrom>
+                <a:srgbClr val="FFFFFF"/>
+              </a:clrFrom>
+              <a:clrTo>
+                <a:srgbClr val="FFFFFF">
+                  <a:alpha val="0"/>
+                </a:srgbClr>
+              </a:clrTo>
+            </a:clrChange>
+            <a:extLst>
+              <a:ext uri="{28A0092B-C50C-407E-A947-70E740481C1C}">
+                <a14:useLocalDpi xmlns:a14="http://schemas.microsoft.com/office/drawing/2010/main" val="0"/>
+              </a:ext>
+            </a:extLst>
+          </a:blip>
+          <a:srcRect l="30314" t="6250" r="31011" b="10764"/>
+          <a:stretch/>
+        </p:blipFill>
+        <p:spPr bwMode="auto">
+          <a:xfrm>
+            <a:off x="6866012" y="1556792"/>
+            <a:ext cx="2314500" cy="4983473"/>
+          </a:xfrm>
+          <a:prstGeom prst="rect">
+            <a:avLst/>
+          </a:prstGeom>
+          <a:noFill/>
+          <a:ln>
+            <a:noFill/>
+          </a:ln>
+          <a:extLst>
+            <a:ext uri="{53640926-AAD7-44D8-BBD7-CCE9431645EC}">
+              <a14:shadowObscured xmlns:a14="http://schemas.microsoft.com/office/drawing/2010/main"/>
+            </a:ext>
+          </a:extLst>
+        </p:spPr>
+      </p:pic>
     </p:spTree>
     <p:extLst>
       <p:ext uri="{BB962C8B-B14F-4D97-AF65-F5344CB8AC3E}">
@@ -5584,7 +6038,7 @@
           <a:p>
             <a:r>
               <a:rPr lang="fr-FR" dirty="0" smtClean="0"/>
-              <a:t>Paramètres cinétiques</a:t>
+              <a:t>Contrôle du réacteur</a:t>
             </a:r>
             <a:endParaRPr lang="fr-FR" dirty="0"/>
           </a:p>
@@ -5603,7 +6057,7 @@
         <p:spPr>
           <a:xfrm>
             <a:off x="0" y="1285860"/>
-            <a:ext cx="9144000" cy="4840303"/>
+            <a:ext cx="8748464" cy="4840303"/>
           </a:xfrm>
         </p:spPr>
         <p:txBody>
@@ -5612,24 +6066,39 @@
           <a:p>
             <a:r>
               <a:rPr lang="fr-FR" dirty="0" smtClean="0"/>
-              <a:t>L*</a:t>
-            </a:r>
-          </a:p>
-          <a:p>
-            <a:r>
-              <a:rPr lang="fr-FR" dirty="0" err="1" smtClean="0"/>
-              <a:t>Beff</a:t>
-            </a:r>
-            <a:endParaRPr lang="fr-FR" dirty="0" smtClean="0"/>
-          </a:p>
-          <a:p>
-            <a:endParaRPr lang="fr-FR" dirty="0" smtClean="0"/>
-          </a:p>
-          <a:p>
-            <a:pPr marL="457200" lvl="1" indent="0">
+              <a:t>Les « grappes » ou les « barres » de poisons</a:t>
+            </a:r>
+          </a:p>
+          <a:p>
+            <a:pPr marL="0" indent="0">
               <a:buNone/>
             </a:pPr>
-            <a:endParaRPr lang="fr-FR" dirty="0"/>
+            <a:r>
+              <a:rPr lang="fr-FR" u="sng" dirty="0" smtClean="0"/>
+              <a:t>Les barres des RNR Français</a:t>
+            </a:r>
+          </a:p>
+          <a:p>
+            <a:pPr marL="349250" lvl="1"/>
+            <a:r>
+              <a:rPr lang="fr-FR" dirty="0" smtClean="0"/>
+              <a:t>Il y avait 6 barres dans Phénix de mêmes dimensions que les 110 assemblages hexagonaux organisés en nid d’abeille dans le cœur </a:t>
+            </a:r>
+          </a:p>
+          <a:p>
+            <a:pPr marL="349250" lvl="1"/>
+            <a:r>
+              <a:rPr lang="fr-FR" dirty="0" smtClean="0"/>
+              <a:t>Les barres sont constitués de quelques crayons </a:t>
+            </a:r>
+            <a:r>
+              <a:rPr lang="fr-FR" dirty="0"/>
+              <a:t>de contrôle </a:t>
+            </a:r>
+            <a:r>
+              <a:rPr lang="fr-FR" dirty="0" smtClean="0"/>
+              <a:t>en B4C</a:t>
+            </a:r>
           </a:p>
         </p:txBody>
       </p:sp>
@@ -5701,10 +6170,102 @@
           </a:p>
         </p:txBody>
       </p:sp>
+      <p:pic>
+        <p:nvPicPr>
+          <p:cNvPr id="1026" name="Picture 2"/>
+          <p:cNvPicPr>
+            <a:picLocks noChangeAspect="1" noChangeArrowheads="1"/>
+          </p:cNvPicPr>
+          <p:nvPr/>
+        </p:nvPicPr>
+        <p:blipFill rotWithShape="1">
+          <a:blip r:embed="rId2">
+            <a:extLst>
+              <a:ext uri="{28A0092B-C50C-407E-A947-70E740481C1C}">
+                <a14:useLocalDpi xmlns:a14="http://schemas.microsoft.com/office/drawing/2010/main" val="0"/>
+              </a:ext>
+            </a:extLst>
+          </a:blip>
+          <a:srcRect b="8818"/>
+          <a:stretch/>
+        </p:blipFill>
+        <p:spPr bwMode="auto">
+          <a:xfrm>
+            <a:off x="2699792" y="2996952"/>
+            <a:ext cx="3816274" cy="3677030"/>
+          </a:xfrm>
+          <a:prstGeom prst="rect">
+            <a:avLst/>
+          </a:prstGeom>
+          <a:noFill/>
+          <a:ln>
+            <a:noFill/>
+          </a:ln>
+          <a:effectLst/>
+          <a:extLst>
+            <a:ext uri="{909E8E84-426E-40DD-AFC4-6F175D3DCCD1}">
+              <a14:hiddenFill xmlns:a14="http://schemas.microsoft.com/office/drawing/2010/main">
+                <a:solidFill>
+                  <a:schemeClr val="accent1"/>
+                </a:solidFill>
+              </a14:hiddenFill>
+            </a:ext>
+            <a:ext uri="{91240B29-F687-4F45-9708-019B960494DF}">
+              <a14:hiddenLine xmlns:a14="http://schemas.microsoft.com/office/drawing/2010/main" w="9525">
+                <a:solidFill>
+                  <a:schemeClr val="tx1"/>
+                </a:solidFill>
+                <a:miter lim="800000"/>
+                <a:headEnd/>
+                <a:tailEnd/>
+              </a14:hiddenLine>
+            </a:ext>
+            <a:ext uri="{AF507438-7753-43E0-B8FC-AC1667EBCBE1}">
+              <a14:hiddenEffects xmlns:a14="http://schemas.microsoft.com/office/drawing/2010/main">
+                <a:effectLst>
+                  <a:outerShdw dist="35921" dir="2700000" algn="ctr" rotWithShape="0">
+                    <a:schemeClr val="bg2"/>
+                  </a:outerShdw>
+                </a:effectLst>
+              </a14:hiddenEffects>
+            </a:ext>
+          </a:extLst>
+        </p:spPr>
+      </p:pic>
+      <p:sp>
+        <p:nvSpPr>
+          <p:cNvPr id="7" name="ZoneTexte 6"/>
+          <p:cNvSpPr txBox="1"/>
+          <p:nvPr/>
+        </p:nvSpPr>
+        <p:spPr>
+          <a:xfrm>
+            <a:off x="5292080" y="6237312"/>
+            <a:ext cx="1223986" cy="369332"/>
+          </a:xfrm>
+          <a:prstGeom prst="rect">
+            <a:avLst/>
+          </a:prstGeom>
+          <a:noFill/>
+        </p:spPr>
+        <p:txBody>
+          <a:bodyPr wrap="square" rtlCol="0">
+            <a:spAutoFit/>
+          </a:bodyPr>
+          <a:lstStyle/>
+          <a:p>
+            <a:r>
+              <a:rPr lang="en-US" dirty="0" err="1" smtClean="0"/>
+              <a:t>Phénix</a:t>
+            </a:r>
+            <a:endParaRPr lang="en-US" dirty="0"/>
+          </a:p>
+        </p:txBody>
+      </p:sp>
     </p:spTree>
     <p:extLst>
       <p:ext uri="{BB962C8B-B14F-4D97-AF65-F5344CB8AC3E}">
-        <p14:creationId xmlns:p14="http://schemas.microsoft.com/office/powerpoint/2010/main" val="2849301196"/>
+        <p14:creationId xmlns:p14="http://schemas.microsoft.com/office/powerpoint/2010/main" val="2534081296"/>
       </p:ext>
     </p:extLst>
   </p:cSld>

</xml_diff>

<commit_message>
GRAND MENAGE DE LA RENTREE 2014 -  changement de date
</commit_message>
<xml_diff>
--- a/Cours2.pptx
+++ b/Cours2.pptx
@@ -251,7 +251,7 @@
               <a:pPr>
                 <a:defRPr/>
               </a:pPr>
-              <a:t>12/11/2013</a:t>
+              <a:t>10/10/2014</a:t>
             </a:fld>
             <a:endParaRPr lang="fr-FR"/>
           </a:p>
@@ -450,7 +450,7 @@
               <a:pPr>
                 <a:defRPr/>
               </a:pPr>
-              <a:t>12/11/2013</a:t>
+              <a:t>10/10/2014</a:t>
             </a:fld>
             <a:endParaRPr lang="fr-FR"/>
           </a:p>
@@ -2348,7 +2348,7 @@
         <p:spPr>
           <a:xfrm>
             <a:off x="0" y="1285860"/>
-            <a:ext cx="8748464" cy="4840303"/>
+            <a:ext cx="8748464" cy="5311492"/>
           </a:xfrm>
         </p:spPr>
         <p:txBody>
@@ -2419,20 +2419,56 @@
               <a:rPr lang="fr-FR" dirty="0"/>
               <a:t>/ppm</a:t>
             </a:r>
+          </a:p>
+          <a:p>
+            <a:pPr marL="0" indent="-336550"/>
+            <a:r>
+              <a:rPr lang="fr-FR" dirty="0"/>
+              <a:t>La coefficient </a:t>
+            </a:r>
+            <a:r>
+              <a:rPr lang="fr-FR" dirty="0" smtClean="0"/>
+              <a:t>Densité-Modérateur (</a:t>
+            </a:r>
+            <a:r>
+              <a:rPr lang="fr-FR" dirty="0" err="1" smtClean="0"/>
+              <a:t>pcm</a:t>
+            </a:r>
+            <a:r>
+              <a:rPr lang="fr-FR" dirty="0" smtClean="0"/>
+              <a:t>/(g/cm</a:t>
+            </a:r>
+            <a:r>
+              <a:rPr lang="fr-FR" baseline="30000" dirty="0" smtClean="0"/>
+              <a:t>3</a:t>
+            </a:r>
+            <a:r>
+              <a:rPr lang="fr-FR" dirty="0" smtClean="0"/>
+              <a:t>)) et Température-Modérateur (</a:t>
+            </a:r>
+            <a:r>
+              <a:rPr lang="fr-FR" dirty="0" err="1" smtClean="0"/>
+              <a:t>pcm</a:t>
+            </a:r>
+            <a:r>
+              <a:rPr lang="fr-FR" dirty="0" smtClean="0"/>
+              <a:t>/°C)</a:t>
+            </a:r>
             <a:endParaRPr lang="fr-FR" dirty="0"/>
           </a:p>
           <a:p>
-            <a:pPr marL="0" indent="-336550"/>
+            <a:pPr marL="349250" lvl="1"/>
             <a:r>
               <a:rPr lang="fr-FR" dirty="0"/>
-              <a:t>La coefficient Densité-Modérateur</a:t>
-            </a:r>
-          </a:p>
-          <a:p>
-            <a:pPr marL="349250" lvl="1"/>
+              <a:t>La concentration en bore est </a:t>
+            </a:r>
+            <a:r>
+              <a:rPr lang="fr-FR" dirty="0" smtClean="0"/>
+              <a:t>maximale </a:t>
+            </a:r>
             <a:r>
               <a:rPr lang="fr-FR" dirty="0"/>
-              <a:t>La concentration en bore est donc maximale en début de cycle</a:t>
+              <a:t>en début de cycle</a:t>
             </a:r>
           </a:p>
           <a:p>

</xml_diff>